<commit_message>
add Pavlova and Makarusho function description
</commit_message>
<xml_diff>
--- a/BankSystem/Presentation.pptx
+++ b/BankSystem/Presentation.pptx
@@ -9,7 +9,16 @@
     <p:sldId id="257" r:id="rId3"/>
     <p:sldId id="258" r:id="rId4"/>
     <p:sldId id="259" r:id="rId5"/>
-    <p:sldId id="260" r:id="rId6"/>
+    <p:sldId id="264" r:id="rId6"/>
+    <p:sldId id="260" r:id="rId7"/>
+    <p:sldId id="261" r:id="rId8"/>
+    <p:sldId id="262" r:id="rId9"/>
+    <p:sldId id="263" r:id="rId10"/>
+    <p:sldId id="265" r:id="rId11"/>
+    <p:sldId id="266" r:id="rId12"/>
+    <p:sldId id="267" r:id="rId13"/>
+    <p:sldId id="268" r:id="rId14"/>
+    <p:sldId id="269" r:id="rId15"/>
   </p:sldIdLst>
   <p:sldSz cx="12192000" cy="6858000"/>
   <p:notesSz cx="6858000" cy="9144000"/>
@@ -3039,6 +3048,507 @@
 </p:sld>
 </file>
 
+<file path=ppt/slides/slide10.xml><?xml version="1.0" encoding="utf-8"?>
+<p:sld xmlns:a="http://schemas.openxmlformats.org/drawingml/2006/main" xmlns:r="http://schemas.openxmlformats.org/officeDocument/2006/relationships" xmlns:p="http://schemas.openxmlformats.org/presentationml/2006/main">
+  <p:cSld>
+    <p:spTree>
+      <p:nvGrpSpPr>
+        <p:cNvPr id="1" name=""/>
+        <p:cNvGrpSpPr/>
+        <p:nvPr/>
+      </p:nvGrpSpPr>
+      <p:grpSpPr>
+        <a:xfrm>
+          <a:off x="0" y="0"/>
+          <a:ext cx="0" cy="0"/>
+          <a:chOff x="0" y="0"/>
+          <a:chExt cx="0" cy="0"/>
+        </a:xfrm>
+      </p:grpSpPr>
+      <p:sp>
+        <p:nvSpPr>
+          <p:cNvPr id="2" name="Заголовок 1"/>
+          <p:cNvSpPr>
+            <a:spLocks noGrp="1"/>
+          </p:cNvSpPr>
+          <p:nvPr>
+            <p:ph type="title"/>
+          </p:nvPr>
+        </p:nvSpPr>
+        <p:spPr/>
+        <p:txBody>
+          <a:bodyPr/>
+          <a:lstStyle/>
+          <a:p>
+            <a:r>
+              <a:rPr lang="ru-RU" dirty="0"/>
+              <a:t>Маргарита Павлова: </a:t>
+            </a:r>
+            <a:r>
+              <a:rPr lang="en-US" dirty="0"/>
+              <a:t>Operator Action</a:t>
+            </a:r>
+            <a:endParaRPr lang="ru-RU" dirty="0"/>
+          </a:p>
+        </p:txBody>
+      </p:sp>
+      <p:pic>
+        <p:nvPicPr>
+          <p:cNvPr id="4" name="Объект 3"/>
+          <p:cNvPicPr>
+            <a:picLocks noGrp="1" noChangeAspect="1"/>
+          </p:cNvPicPr>
+          <p:nvPr>
+            <p:ph idx="1"/>
+          </p:nvPr>
+        </p:nvPicPr>
+        <p:blipFill>
+          <a:blip r:embed="rId2">
+            <a:extLst>
+              <a:ext uri="{28A0092B-C50C-407E-A947-70E740481C1C}">
+                <a14:useLocalDpi xmlns:a14="http://schemas.microsoft.com/office/drawing/2010/main" val="0"/>
+              </a:ext>
+            </a:extLst>
+          </a:blip>
+          <a:stretch>
+            <a:fillRect/>
+          </a:stretch>
+        </p:blipFill>
+        <p:spPr>
+          <a:xfrm>
+            <a:off x="2915913" y="1364567"/>
+            <a:ext cx="6360175" cy="5493434"/>
+          </a:xfrm>
+        </p:spPr>
+      </p:pic>
+    </p:spTree>
+    <p:extLst>
+      <p:ext uri="{BB962C8B-B14F-4D97-AF65-F5344CB8AC3E}">
+        <p14:creationId xmlns:p14="http://schemas.microsoft.com/office/powerpoint/2010/main" val="30661338"/>
+      </p:ext>
+    </p:extLst>
+  </p:cSld>
+  <p:clrMapOvr>
+    <a:masterClrMapping/>
+  </p:clrMapOvr>
+  <p:timing>
+    <p:tnLst>
+      <p:par>
+        <p:cTn id="1" dur="indefinite" restart="never" nodeType="tmRoot"/>
+      </p:par>
+    </p:tnLst>
+  </p:timing>
+</p:sld>
+</file>
+
+<file path=ppt/slides/slide11.xml><?xml version="1.0" encoding="utf-8"?>
+<p:sld xmlns:a="http://schemas.openxmlformats.org/drawingml/2006/main" xmlns:r="http://schemas.openxmlformats.org/officeDocument/2006/relationships" xmlns:p="http://schemas.openxmlformats.org/presentationml/2006/main">
+  <p:cSld>
+    <p:spTree>
+      <p:nvGrpSpPr>
+        <p:cNvPr id="1" name=""/>
+        <p:cNvGrpSpPr/>
+        <p:nvPr/>
+      </p:nvGrpSpPr>
+      <p:grpSpPr>
+        <a:xfrm>
+          <a:off x="0" y="0"/>
+          <a:ext cx="0" cy="0"/>
+          <a:chOff x="0" y="0"/>
+          <a:chExt cx="0" cy="0"/>
+        </a:xfrm>
+      </p:grpSpPr>
+      <p:sp>
+        <p:nvSpPr>
+          <p:cNvPr id="2" name="Заголовок 1"/>
+          <p:cNvSpPr>
+            <a:spLocks noGrp="1"/>
+          </p:cNvSpPr>
+          <p:nvPr>
+            <p:ph type="title"/>
+          </p:nvPr>
+        </p:nvSpPr>
+        <p:spPr/>
+        <p:txBody>
+          <a:bodyPr/>
+          <a:lstStyle/>
+          <a:p>
+            <a:r>
+              <a:rPr lang="ru-RU" dirty="0"/>
+              <a:t>Маргарита Павлова: </a:t>
+            </a:r>
+            <a:r>
+              <a:rPr lang="en-US" dirty="0"/>
+              <a:t>Operator Action</a:t>
+            </a:r>
+            <a:endParaRPr lang="ru-RU" dirty="0"/>
+          </a:p>
+        </p:txBody>
+      </p:sp>
+      <p:pic>
+        <p:nvPicPr>
+          <p:cNvPr id="5" name="Объект 4"/>
+          <p:cNvPicPr>
+            <a:picLocks noGrp="1" noChangeAspect="1"/>
+          </p:cNvPicPr>
+          <p:nvPr>
+            <p:ph idx="1"/>
+          </p:nvPr>
+        </p:nvPicPr>
+        <p:blipFill>
+          <a:blip r:embed="rId2">
+            <a:extLst>
+              <a:ext uri="{28A0092B-C50C-407E-A947-70E740481C1C}">
+                <a14:useLocalDpi xmlns:a14="http://schemas.microsoft.com/office/drawing/2010/main" val="0"/>
+              </a:ext>
+            </a:extLst>
+          </a:blip>
+          <a:stretch>
+            <a:fillRect/>
+          </a:stretch>
+        </p:blipFill>
+        <p:spPr>
+          <a:xfrm>
+            <a:off x="906768" y="1617785"/>
+            <a:ext cx="10378464" cy="4783004"/>
+          </a:xfrm>
+        </p:spPr>
+      </p:pic>
+    </p:spTree>
+    <p:extLst>
+      <p:ext uri="{BB962C8B-B14F-4D97-AF65-F5344CB8AC3E}">
+        <p14:creationId xmlns:p14="http://schemas.microsoft.com/office/powerpoint/2010/main" val="1313480065"/>
+      </p:ext>
+    </p:extLst>
+  </p:cSld>
+  <p:clrMapOvr>
+    <a:masterClrMapping/>
+  </p:clrMapOvr>
+  <p:timing>
+    <p:tnLst>
+      <p:par>
+        <p:cTn id="1" dur="indefinite" restart="never" nodeType="tmRoot"/>
+      </p:par>
+    </p:tnLst>
+  </p:timing>
+</p:sld>
+</file>
+
+<file path=ppt/slides/slide12.xml><?xml version="1.0" encoding="utf-8"?>
+<p:sld xmlns:a="http://schemas.openxmlformats.org/drawingml/2006/main" xmlns:r="http://schemas.openxmlformats.org/officeDocument/2006/relationships" xmlns:p="http://schemas.openxmlformats.org/presentationml/2006/main">
+  <p:cSld>
+    <p:spTree>
+      <p:nvGrpSpPr>
+        <p:cNvPr id="1" name=""/>
+        <p:cNvGrpSpPr/>
+        <p:nvPr/>
+      </p:nvGrpSpPr>
+      <p:grpSpPr>
+        <a:xfrm>
+          <a:off x="0" y="0"/>
+          <a:ext cx="0" cy="0"/>
+          <a:chOff x="0" y="0"/>
+          <a:chExt cx="0" cy="0"/>
+        </a:xfrm>
+      </p:grpSpPr>
+      <p:sp>
+        <p:nvSpPr>
+          <p:cNvPr id="2" name="Заголовок 1"/>
+          <p:cNvSpPr>
+            <a:spLocks noGrp="1"/>
+          </p:cNvSpPr>
+          <p:nvPr>
+            <p:ph type="title"/>
+          </p:nvPr>
+        </p:nvSpPr>
+        <p:spPr/>
+        <p:txBody>
+          <a:bodyPr/>
+          <a:lstStyle/>
+          <a:p>
+            <a:r>
+              <a:rPr lang="ru-RU" dirty="0" smtClean="0"/>
+              <a:t>Ирина </a:t>
+            </a:r>
+            <a:r>
+              <a:rPr lang="ru-RU" dirty="0" err="1" smtClean="0"/>
+              <a:t>Макарушко</a:t>
+            </a:r>
+            <a:r>
+              <a:rPr lang="ru-RU" dirty="0" smtClean="0"/>
+              <a:t>:</a:t>
+            </a:r>
+            <a:r>
+              <a:rPr lang="en-US" dirty="0" smtClean="0"/>
+              <a:t> </a:t>
+            </a:r>
+            <a:r>
+              <a:rPr lang="ru-RU" dirty="0" smtClean="0"/>
+              <a:t>Авторизация</a:t>
+            </a:r>
+            <a:endParaRPr lang="ru-RU" dirty="0"/>
+          </a:p>
+        </p:txBody>
+      </p:sp>
+      <p:pic>
+        <p:nvPicPr>
+          <p:cNvPr id="4" name="Объект 3"/>
+          <p:cNvPicPr>
+            <a:picLocks noGrp="1" noChangeAspect="1"/>
+          </p:cNvPicPr>
+          <p:nvPr>
+            <p:ph idx="1"/>
+          </p:nvPr>
+        </p:nvPicPr>
+        <p:blipFill>
+          <a:blip r:embed="rId2">
+            <a:extLst>
+              <a:ext uri="{28A0092B-C50C-407E-A947-70E740481C1C}">
+                <a14:useLocalDpi xmlns:a14="http://schemas.microsoft.com/office/drawing/2010/main" val="0"/>
+              </a:ext>
+            </a:extLst>
+          </a:blip>
+          <a:stretch>
+            <a:fillRect/>
+          </a:stretch>
+        </p:blipFill>
+        <p:spPr>
+          <a:xfrm>
+            <a:off x="2447196" y="1513418"/>
+            <a:ext cx="7297609" cy="5029737"/>
+          </a:xfrm>
+        </p:spPr>
+      </p:pic>
+    </p:spTree>
+    <p:extLst>
+      <p:ext uri="{BB962C8B-B14F-4D97-AF65-F5344CB8AC3E}">
+        <p14:creationId xmlns:p14="http://schemas.microsoft.com/office/powerpoint/2010/main" val="3879038834"/>
+      </p:ext>
+    </p:extLst>
+  </p:cSld>
+  <p:clrMapOvr>
+    <a:masterClrMapping/>
+  </p:clrMapOvr>
+  <p:timing>
+    <p:tnLst>
+      <p:par>
+        <p:cTn id="1" dur="indefinite" restart="never" nodeType="tmRoot"/>
+      </p:par>
+    </p:tnLst>
+  </p:timing>
+</p:sld>
+</file>
+
+<file path=ppt/slides/slide13.xml><?xml version="1.0" encoding="utf-8"?>
+<p:sld xmlns:a="http://schemas.openxmlformats.org/drawingml/2006/main" xmlns:r="http://schemas.openxmlformats.org/officeDocument/2006/relationships" xmlns:p="http://schemas.openxmlformats.org/presentationml/2006/main">
+  <p:cSld>
+    <p:spTree>
+      <p:nvGrpSpPr>
+        <p:cNvPr id="1" name=""/>
+        <p:cNvGrpSpPr/>
+        <p:nvPr/>
+      </p:nvGrpSpPr>
+      <p:grpSpPr>
+        <a:xfrm>
+          <a:off x="0" y="0"/>
+          <a:ext cx="0" cy="0"/>
+          <a:chOff x="0" y="0"/>
+          <a:chExt cx="0" cy="0"/>
+        </a:xfrm>
+      </p:grpSpPr>
+      <p:sp>
+        <p:nvSpPr>
+          <p:cNvPr id="2" name="Заголовок 1"/>
+          <p:cNvSpPr>
+            <a:spLocks noGrp="1"/>
+          </p:cNvSpPr>
+          <p:nvPr>
+            <p:ph type="title"/>
+          </p:nvPr>
+        </p:nvSpPr>
+        <p:spPr/>
+        <p:txBody>
+          <a:bodyPr/>
+          <a:lstStyle/>
+          <a:p>
+            <a:r>
+              <a:rPr lang="ru-RU" dirty="0"/>
+              <a:t>Ирина </a:t>
+            </a:r>
+            <a:r>
+              <a:rPr lang="ru-RU" dirty="0" err="1"/>
+              <a:t>Макарушко</a:t>
+            </a:r>
+            <a:r>
+              <a:rPr lang="ru-RU" dirty="0"/>
+              <a:t>:</a:t>
+            </a:r>
+            <a:r>
+              <a:rPr lang="en-US" dirty="0"/>
+              <a:t> </a:t>
+            </a:r>
+            <a:r>
+              <a:rPr lang="ru-RU" dirty="0" smtClean="0"/>
+              <a:t>Аутентификация</a:t>
+            </a:r>
+            <a:endParaRPr lang="ru-RU" dirty="0"/>
+          </a:p>
+        </p:txBody>
+      </p:sp>
+      <p:pic>
+        <p:nvPicPr>
+          <p:cNvPr id="4" name="Объект 3"/>
+          <p:cNvPicPr>
+            <a:picLocks noGrp="1" noChangeAspect="1"/>
+          </p:cNvPicPr>
+          <p:nvPr>
+            <p:ph idx="1"/>
+          </p:nvPr>
+        </p:nvPicPr>
+        <p:blipFill>
+          <a:blip r:embed="rId2">
+            <a:extLst>
+              <a:ext uri="{28A0092B-C50C-407E-A947-70E740481C1C}">
+                <a14:useLocalDpi xmlns:a14="http://schemas.microsoft.com/office/drawing/2010/main" val="0"/>
+              </a:ext>
+            </a:extLst>
+          </a:blip>
+          <a:stretch>
+            <a:fillRect/>
+          </a:stretch>
+        </p:blipFill>
+        <p:spPr>
+          <a:xfrm>
+            <a:off x="1551118" y="1603717"/>
+            <a:ext cx="9089765" cy="4660851"/>
+          </a:xfrm>
+        </p:spPr>
+      </p:pic>
+    </p:spTree>
+    <p:extLst>
+      <p:ext uri="{BB962C8B-B14F-4D97-AF65-F5344CB8AC3E}">
+        <p14:creationId xmlns:p14="http://schemas.microsoft.com/office/powerpoint/2010/main" val="92575562"/>
+      </p:ext>
+    </p:extLst>
+  </p:cSld>
+  <p:clrMapOvr>
+    <a:masterClrMapping/>
+  </p:clrMapOvr>
+  <p:timing>
+    <p:tnLst>
+      <p:par>
+        <p:cTn id="1" dur="indefinite" restart="never" nodeType="tmRoot"/>
+      </p:par>
+    </p:tnLst>
+  </p:timing>
+</p:sld>
+</file>
+
+<file path=ppt/slides/slide14.xml><?xml version="1.0" encoding="utf-8"?>
+<p:sld xmlns:a="http://schemas.openxmlformats.org/drawingml/2006/main" xmlns:r="http://schemas.openxmlformats.org/officeDocument/2006/relationships" xmlns:p="http://schemas.openxmlformats.org/presentationml/2006/main">
+  <p:cSld>
+    <p:spTree>
+      <p:nvGrpSpPr>
+        <p:cNvPr id="1" name=""/>
+        <p:cNvGrpSpPr/>
+        <p:nvPr/>
+      </p:nvGrpSpPr>
+      <p:grpSpPr>
+        <a:xfrm>
+          <a:off x="0" y="0"/>
+          <a:ext cx="0" cy="0"/>
+          <a:chOff x="0" y="0"/>
+          <a:chExt cx="0" cy="0"/>
+        </a:xfrm>
+      </p:grpSpPr>
+      <p:sp>
+        <p:nvSpPr>
+          <p:cNvPr id="2" name="Заголовок 1"/>
+          <p:cNvSpPr>
+            <a:spLocks noGrp="1"/>
+          </p:cNvSpPr>
+          <p:nvPr>
+            <p:ph type="title"/>
+          </p:nvPr>
+        </p:nvSpPr>
+        <p:spPr/>
+        <p:txBody>
+          <a:bodyPr/>
+          <a:lstStyle/>
+          <a:p>
+            <a:r>
+              <a:rPr lang="ru-RU" dirty="0"/>
+              <a:t>Ирина </a:t>
+            </a:r>
+            <a:r>
+              <a:rPr lang="ru-RU" dirty="0" err="1"/>
+              <a:t>Макарушко</a:t>
+            </a:r>
+            <a:r>
+              <a:rPr lang="ru-RU" dirty="0"/>
+              <a:t>:</a:t>
+            </a:r>
+            <a:r>
+              <a:rPr lang="en-US" dirty="0"/>
+              <a:t> </a:t>
+            </a:r>
+            <a:r>
+              <a:rPr lang="en-US" dirty="0" smtClean="0"/>
+              <a:t>Action</a:t>
+            </a:r>
+            <a:endParaRPr lang="ru-RU" dirty="0"/>
+          </a:p>
+        </p:txBody>
+      </p:sp>
+      <p:pic>
+        <p:nvPicPr>
+          <p:cNvPr id="4" name="Объект 3"/>
+          <p:cNvPicPr>
+            <a:picLocks noGrp="1" noChangeAspect="1"/>
+          </p:cNvPicPr>
+          <p:nvPr>
+            <p:ph idx="1"/>
+          </p:nvPr>
+        </p:nvPicPr>
+        <p:blipFill>
+          <a:blip r:embed="rId2">
+            <a:extLst>
+              <a:ext uri="{28A0092B-C50C-407E-A947-70E740481C1C}">
+                <a14:useLocalDpi xmlns:a14="http://schemas.microsoft.com/office/drawing/2010/main" val="0"/>
+              </a:ext>
+            </a:extLst>
+          </a:blip>
+          <a:stretch>
+            <a:fillRect/>
+          </a:stretch>
+        </p:blipFill>
+        <p:spPr>
+          <a:xfrm>
+            <a:off x="2375341" y="1392702"/>
+            <a:ext cx="7441318" cy="5282418"/>
+          </a:xfrm>
+        </p:spPr>
+      </p:pic>
+    </p:spTree>
+    <p:extLst>
+      <p:ext uri="{BB962C8B-B14F-4D97-AF65-F5344CB8AC3E}">
+        <p14:creationId xmlns:p14="http://schemas.microsoft.com/office/powerpoint/2010/main" val="3203022435"/>
+      </p:ext>
+    </p:extLst>
+  </p:cSld>
+  <p:clrMapOvr>
+    <a:masterClrMapping/>
+  </p:clrMapOvr>
+  <p:timing>
+    <p:tnLst>
+      <p:par>
+        <p:cTn id="1" dur="indefinite" restart="never" nodeType="tmRoot"/>
+      </p:par>
+    </p:tnLst>
+  </p:timing>
+</p:sld>
+</file>
+
 <file path=ppt/slides/slide2.xml><?xml version="1.0" encoding="utf-8"?>
 <p:sld xmlns:a="http://schemas.openxmlformats.org/drawingml/2006/main" xmlns:r="http://schemas.openxmlformats.org/officeDocument/2006/relationships" xmlns:p="http://schemas.openxmlformats.org/presentationml/2006/main">
   <p:cSld>
@@ -3335,10 +3845,141 @@
           <a:bodyPr/>
           <a:lstStyle/>
           <a:p>
-            <a:endParaRPr lang="ru-RU"/>
-          </a:p>
-        </p:txBody>
-      </p:sp>
+            <a:r>
+              <a:rPr lang="ru-RU" dirty="0"/>
+              <a:t>Маргарита Павлова: </a:t>
+            </a:r>
+            <a:r>
+              <a:rPr lang="en-US" dirty="0" err="1" smtClean="0"/>
+              <a:t>Config</a:t>
+            </a:r>
+            <a:endParaRPr lang="ru-RU" dirty="0"/>
+          </a:p>
+        </p:txBody>
+      </p:sp>
+      <p:pic>
+        <p:nvPicPr>
+          <p:cNvPr id="4" name="Объект 3"/>
+          <p:cNvPicPr>
+            <a:picLocks noGrp="1" noChangeAspect="1"/>
+          </p:cNvPicPr>
+          <p:nvPr>
+            <p:ph idx="1"/>
+          </p:nvPr>
+        </p:nvPicPr>
+        <p:blipFill>
+          <a:blip r:embed="rId2">
+            <a:extLst>
+              <a:ext uri="{28A0092B-C50C-407E-A947-70E740481C1C}">
+                <a14:useLocalDpi xmlns:a14="http://schemas.microsoft.com/office/drawing/2010/main" val="0"/>
+              </a:ext>
+            </a:extLst>
+          </a:blip>
+          <a:stretch>
+            <a:fillRect/>
+          </a:stretch>
+        </p:blipFill>
+        <p:spPr>
+          <a:xfrm>
+            <a:off x="1853556" y="1718297"/>
+            <a:ext cx="8484889" cy="4541825"/>
+          </a:xfrm>
+        </p:spPr>
+      </p:pic>
+    </p:spTree>
+    <p:extLst>
+      <p:ext uri="{BB962C8B-B14F-4D97-AF65-F5344CB8AC3E}">
+        <p14:creationId xmlns:p14="http://schemas.microsoft.com/office/powerpoint/2010/main" val="788443232"/>
+      </p:ext>
+    </p:extLst>
+  </p:cSld>
+  <p:clrMapOvr>
+    <a:masterClrMapping/>
+  </p:clrMapOvr>
+  <p:timing>
+    <p:tnLst>
+      <p:par>
+        <p:cTn id="1" dur="indefinite" restart="never" nodeType="tmRoot"/>
+      </p:par>
+    </p:tnLst>
+  </p:timing>
+</p:sld>
+</file>
+
+<file path=ppt/slides/slide6.xml><?xml version="1.0" encoding="utf-8"?>
+<p:sld xmlns:a="http://schemas.openxmlformats.org/drawingml/2006/main" xmlns:r="http://schemas.openxmlformats.org/officeDocument/2006/relationships" xmlns:p="http://schemas.openxmlformats.org/presentationml/2006/main">
+  <p:cSld>
+    <p:spTree>
+      <p:nvGrpSpPr>
+        <p:cNvPr id="1" name=""/>
+        <p:cNvGrpSpPr/>
+        <p:nvPr/>
+      </p:nvGrpSpPr>
+      <p:grpSpPr>
+        <a:xfrm>
+          <a:off x="0" y="0"/>
+          <a:ext cx="0" cy="0"/>
+          <a:chOff x="0" y="0"/>
+          <a:chExt cx="0" cy="0"/>
+        </a:xfrm>
+      </p:grpSpPr>
+      <p:sp>
+        <p:nvSpPr>
+          <p:cNvPr id="2" name="Заголовок 1"/>
+          <p:cNvSpPr>
+            <a:spLocks noGrp="1"/>
+          </p:cNvSpPr>
+          <p:nvPr>
+            <p:ph type="title"/>
+          </p:nvPr>
+        </p:nvSpPr>
+        <p:spPr/>
+        <p:txBody>
+          <a:bodyPr/>
+          <a:lstStyle/>
+          <a:p>
+            <a:r>
+              <a:rPr lang="ru-RU" dirty="0" smtClean="0"/>
+              <a:t>Маргарита Павлова: </a:t>
+            </a:r>
+            <a:r>
+              <a:rPr lang="en-US" dirty="0" smtClean="0"/>
+              <a:t>Add Money</a:t>
+            </a:r>
+            <a:endParaRPr lang="ru-RU" dirty="0"/>
+          </a:p>
+        </p:txBody>
+      </p:sp>
+      <p:pic>
+        <p:nvPicPr>
+          <p:cNvPr id="3" name="Рисунок 2"/>
+          <p:cNvPicPr>
+            <a:picLocks noChangeAspect="1"/>
+          </p:cNvPicPr>
+          <p:nvPr/>
+        </p:nvPicPr>
+        <p:blipFill>
+          <a:blip r:embed="rId2">
+            <a:extLst>
+              <a:ext uri="{28A0092B-C50C-407E-A947-70E740481C1C}">
+                <a14:useLocalDpi xmlns:a14="http://schemas.microsoft.com/office/drawing/2010/main" val="0"/>
+              </a:ext>
+            </a:extLst>
+          </a:blip>
+          <a:stretch>
+            <a:fillRect/>
+          </a:stretch>
+        </p:blipFill>
+        <p:spPr>
+          <a:xfrm>
+            <a:off x="1376661" y="1477546"/>
+            <a:ext cx="9438679" cy="5007659"/>
+          </a:xfrm>
+          <a:prstGeom prst="rect">
+            <a:avLst/>
+          </a:prstGeom>
+        </p:spPr>
+      </p:pic>
     </p:spTree>
     <p:extLst>
       <p:ext uri="{BB962C8B-B14F-4D97-AF65-F5344CB8AC3E}">
@@ -3349,6 +3990,292 @@
   <p:clrMapOvr>
     <a:masterClrMapping/>
   </p:clrMapOvr>
+  <p:timing>
+    <p:tnLst>
+      <p:par>
+        <p:cTn id="1" dur="indefinite" restart="never" nodeType="tmRoot"/>
+      </p:par>
+    </p:tnLst>
+  </p:timing>
+</p:sld>
+</file>
+
+<file path=ppt/slides/slide7.xml><?xml version="1.0" encoding="utf-8"?>
+<p:sld xmlns:a="http://schemas.openxmlformats.org/drawingml/2006/main" xmlns:r="http://schemas.openxmlformats.org/officeDocument/2006/relationships" xmlns:p="http://schemas.openxmlformats.org/presentationml/2006/main">
+  <p:cSld>
+    <p:spTree>
+      <p:nvGrpSpPr>
+        <p:cNvPr id="1" name=""/>
+        <p:cNvGrpSpPr/>
+        <p:nvPr/>
+      </p:nvGrpSpPr>
+      <p:grpSpPr>
+        <a:xfrm>
+          <a:off x="0" y="0"/>
+          <a:ext cx="0" cy="0"/>
+          <a:chOff x="0" y="0"/>
+          <a:chExt cx="0" cy="0"/>
+        </a:xfrm>
+      </p:grpSpPr>
+      <p:sp>
+        <p:nvSpPr>
+          <p:cNvPr id="2" name="Заголовок 1"/>
+          <p:cNvSpPr>
+            <a:spLocks noGrp="1"/>
+          </p:cNvSpPr>
+          <p:nvPr>
+            <p:ph type="title"/>
+          </p:nvPr>
+        </p:nvSpPr>
+        <p:spPr/>
+        <p:txBody>
+          <a:bodyPr/>
+          <a:lstStyle/>
+          <a:p>
+            <a:r>
+              <a:rPr lang="ru-RU" dirty="0"/>
+              <a:t>Маргарита Павлова: </a:t>
+            </a:r>
+            <a:r>
+              <a:rPr lang="en-US" dirty="0" smtClean="0"/>
+              <a:t>Withdraw Money</a:t>
+            </a:r>
+            <a:endParaRPr lang="ru-RU" dirty="0"/>
+          </a:p>
+        </p:txBody>
+      </p:sp>
+      <p:pic>
+        <p:nvPicPr>
+          <p:cNvPr id="4" name="Объект 3"/>
+          <p:cNvPicPr>
+            <a:picLocks noGrp="1" noChangeAspect="1"/>
+          </p:cNvPicPr>
+          <p:nvPr>
+            <p:ph idx="1"/>
+          </p:nvPr>
+        </p:nvPicPr>
+        <p:blipFill>
+          <a:blip r:embed="rId2">
+            <a:extLst>
+              <a:ext uri="{28A0092B-C50C-407E-A947-70E740481C1C}">
+                <a14:useLocalDpi xmlns:a14="http://schemas.microsoft.com/office/drawing/2010/main" val="0"/>
+              </a:ext>
+            </a:extLst>
+          </a:blip>
+          <a:stretch>
+            <a:fillRect/>
+          </a:stretch>
+        </p:blipFill>
+        <p:spPr>
+          <a:xfrm>
+            <a:off x="1439286" y="1829547"/>
+            <a:ext cx="9313429" cy="4458712"/>
+          </a:xfrm>
+        </p:spPr>
+      </p:pic>
+    </p:spTree>
+    <p:extLst>
+      <p:ext uri="{BB962C8B-B14F-4D97-AF65-F5344CB8AC3E}">
+        <p14:creationId xmlns:p14="http://schemas.microsoft.com/office/powerpoint/2010/main" val="3653954168"/>
+      </p:ext>
+    </p:extLst>
+  </p:cSld>
+  <p:clrMapOvr>
+    <a:masterClrMapping/>
+  </p:clrMapOvr>
+  <p:timing>
+    <p:tnLst>
+      <p:par>
+        <p:cTn id="1" dur="indefinite" restart="never" nodeType="tmRoot"/>
+      </p:par>
+    </p:tnLst>
+  </p:timing>
+</p:sld>
+</file>
+
+<file path=ppt/slides/slide8.xml><?xml version="1.0" encoding="utf-8"?>
+<p:sld xmlns:a="http://schemas.openxmlformats.org/drawingml/2006/main" xmlns:r="http://schemas.openxmlformats.org/officeDocument/2006/relationships" xmlns:p="http://schemas.openxmlformats.org/presentationml/2006/main">
+  <p:cSld>
+    <p:spTree>
+      <p:nvGrpSpPr>
+        <p:cNvPr id="1" name=""/>
+        <p:cNvGrpSpPr/>
+        <p:nvPr/>
+      </p:nvGrpSpPr>
+      <p:grpSpPr>
+        <a:xfrm>
+          <a:off x="0" y="0"/>
+          <a:ext cx="0" cy="0"/>
+          <a:chOff x="0" y="0"/>
+          <a:chExt cx="0" cy="0"/>
+        </a:xfrm>
+      </p:grpSpPr>
+      <p:sp>
+        <p:nvSpPr>
+          <p:cNvPr id="2" name="Заголовок 1"/>
+          <p:cNvSpPr>
+            <a:spLocks noGrp="1"/>
+          </p:cNvSpPr>
+          <p:nvPr>
+            <p:ph type="title"/>
+          </p:nvPr>
+        </p:nvSpPr>
+        <p:spPr/>
+        <p:txBody>
+          <a:bodyPr/>
+          <a:lstStyle/>
+          <a:p>
+            <a:r>
+              <a:rPr lang="ru-RU" dirty="0"/>
+              <a:t>Маргарита Павлова: </a:t>
+            </a:r>
+            <a:r>
+              <a:rPr lang="en-US" dirty="0" smtClean="0"/>
+              <a:t>Operator Action</a:t>
+            </a:r>
+            <a:endParaRPr lang="ru-RU" dirty="0"/>
+          </a:p>
+        </p:txBody>
+      </p:sp>
+      <p:pic>
+        <p:nvPicPr>
+          <p:cNvPr id="4" name="Объект 3"/>
+          <p:cNvPicPr>
+            <a:picLocks noGrp="1" noChangeAspect="1"/>
+          </p:cNvPicPr>
+          <p:nvPr>
+            <p:ph idx="1"/>
+          </p:nvPr>
+        </p:nvPicPr>
+        <p:blipFill>
+          <a:blip r:embed="rId2">
+            <a:extLst>
+              <a:ext uri="{28A0092B-C50C-407E-A947-70E740481C1C}">
+                <a14:useLocalDpi xmlns:a14="http://schemas.microsoft.com/office/drawing/2010/main" val="0"/>
+              </a:ext>
+            </a:extLst>
+          </a:blip>
+          <a:stretch>
+            <a:fillRect/>
+          </a:stretch>
+        </p:blipFill>
+        <p:spPr>
+          <a:xfrm>
+            <a:off x="1299994" y="1800665"/>
+            <a:ext cx="9592012" cy="4572000"/>
+          </a:xfrm>
+        </p:spPr>
+      </p:pic>
+    </p:spTree>
+    <p:extLst>
+      <p:ext uri="{BB962C8B-B14F-4D97-AF65-F5344CB8AC3E}">
+        <p14:creationId xmlns:p14="http://schemas.microsoft.com/office/powerpoint/2010/main" val="3294844213"/>
+      </p:ext>
+    </p:extLst>
+  </p:cSld>
+  <p:clrMapOvr>
+    <a:masterClrMapping/>
+  </p:clrMapOvr>
+  <p:timing>
+    <p:tnLst>
+      <p:par>
+        <p:cTn id="1" dur="indefinite" restart="never" nodeType="tmRoot"/>
+      </p:par>
+    </p:tnLst>
+  </p:timing>
+</p:sld>
+</file>
+
+<file path=ppt/slides/slide9.xml><?xml version="1.0" encoding="utf-8"?>
+<p:sld xmlns:a="http://schemas.openxmlformats.org/drawingml/2006/main" xmlns:r="http://schemas.openxmlformats.org/officeDocument/2006/relationships" xmlns:p="http://schemas.openxmlformats.org/presentationml/2006/main">
+  <p:cSld>
+    <p:spTree>
+      <p:nvGrpSpPr>
+        <p:cNvPr id="1" name=""/>
+        <p:cNvGrpSpPr/>
+        <p:nvPr/>
+      </p:nvGrpSpPr>
+      <p:grpSpPr>
+        <a:xfrm>
+          <a:off x="0" y="0"/>
+          <a:ext cx="0" cy="0"/>
+          <a:chOff x="0" y="0"/>
+          <a:chExt cx="0" cy="0"/>
+        </a:xfrm>
+      </p:grpSpPr>
+      <p:sp>
+        <p:nvSpPr>
+          <p:cNvPr id="2" name="Заголовок 1"/>
+          <p:cNvSpPr>
+            <a:spLocks noGrp="1"/>
+          </p:cNvSpPr>
+          <p:nvPr>
+            <p:ph type="title"/>
+          </p:nvPr>
+        </p:nvSpPr>
+        <p:spPr/>
+        <p:txBody>
+          <a:bodyPr/>
+          <a:lstStyle/>
+          <a:p>
+            <a:r>
+              <a:rPr lang="ru-RU" dirty="0"/>
+              <a:t>Маргарита Павлова: </a:t>
+            </a:r>
+            <a:r>
+              <a:rPr lang="en-US" dirty="0"/>
+              <a:t>Operator Action</a:t>
+            </a:r>
+            <a:endParaRPr lang="ru-RU" dirty="0"/>
+          </a:p>
+        </p:txBody>
+      </p:sp>
+      <p:pic>
+        <p:nvPicPr>
+          <p:cNvPr id="4" name="Объект 3"/>
+          <p:cNvPicPr>
+            <a:picLocks noGrp="1" noChangeAspect="1"/>
+          </p:cNvPicPr>
+          <p:nvPr>
+            <p:ph idx="1"/>
+          </p:nvPr>
+        </p:nvPicPr>
+        <p:blipFill>
+          <a:blip r:embed="rId2">
+            <a:extLst>
+              <a:ext uri="{28A0092B-C50C-407E-A947-70E740481C1C}">
+                <a14:useLocalDpi xmlns:a14="http://schemas.microsoft.com/office/drawing/2010/main" val="0"/>
+              </a:ext>
+            </a:extLst>
+          </a:blip>
+          <a:stretch>
+            <a:fillRect/>
+          </a:stretch>
+        </p:blipFill>
+        <p:spPr>
+          <a:xfrm>
+            <a:off x="1737583" y="1404166"/>
+            <a:ext cx="8716834" cy="5205733"/>
+          </a:xfrm>
+        </p:spPr>
+      </p:pic>
+    </p:spTree>
+    <p:extLst>
+      <p:ext uri="{BB962C8B-B14F-4D97-AF65-F5344CB8AC3E}">
+        <p14:creationId xmlns:p14="http://schemas.microsoft.com/office/powerpoint/2010/main" val="3899896371"/>
+      </p:ext>
+    </p:extLst>
+  </p:cSld>
+  <p:clrMapOvr>
+    <a:masterClrMapping/>
+  </p:clrMapOvr>
+  <p:timing>
+    <p:tnLst>
+      <p:par>
+        <p:cTn id="1" dur="indefinite" restart="never" nodeType="tmRoot"/>
+      </p:par>
+    </p:tnLst>
+  </p:timing>
 </p:sld>
 </file>
 
@@ -3395,7 +4322,7 @@
     </a:clrScheme>
     <a:fontScheme name="Стандартная">
       <a:majorFont>
-        <a:latin typeface="Calibri Light" panose="020F0302020204030204"/>
+        <a:latin typeface="Calibri Light"/>
         <a:ea typeface=""/>
         <a:cs typeface=""/>
         <a:font script="Jpan" typeface="ＭＳ Ｐゴシック"/>
@@ -3430,7 +4357,7 @@
         <a:font script="Geor" typeface="Sylfaen"/>
       </a:majorFont>
       <a:minorFont>
-        <a:latin typeface="Calibri" panose="020F0502020204030204"/>
+        <a:latin typeface="Calibri"/>
         <a:ea typeface=""/>
         <a:cs typeface=""/>
         <a:font script="Jpan" typeface="ＭＳ Ｐゴシック"/>
@@ -3607,7 +4534,7 @@
   <a:extraClrSchemeLst/>
   <a:extLst>
     <a:ext uri="{05A4C25C-085E-4340-85A3-A5531E510DB2}">
-      <thm15:themeFamily xmlns:thm15="http://schemas.microsoft.com/office/thememl/2012/main" name="Office Theme" id="{62F939B6-93AF-4DB8-9C6B-D6C7DFDC589F}" vid="{4A3C46E8-61CC-4603-A589-7422A47A8E4A}"/>
+      <thm15:themeFamily xmlns:thm15="http://schemas.microsoft.com/office/thememl/2012/main" xmlns="" name="Office Theme" id="{62F939B6-93AF-4DB8-9C6B-D6C7DFDC589F}" vid="{4A3C46E8-61CC-4603-A589-7422A47A8E4A}"/>
     </a:ext>
   </a:extLst>
 </a:theme>

</xml_diff>